<commit_message>
draft through chapter 3.5
</commit_message>
<xml_diff>
--- a/figsrc/figures.pptx
+++ b/figsrc/figures.pptx
@@ -6,6 +6,7 @@
   </p:sldMasterIdLst>
   <p:sldIdLst>
     <p:sldId id="256" r:id="rId2"/>
+    <p:sldId id="257" r:id="rId3"/>
   </p:sldIdLst>
   <p:sldSz cx="12192000" cy="6858000"/>
   <p:notesSz cx="6858000" cy="9144000"/>
@@ -104,6 +105,11 @@
       </a:defRPr>
     </a:lvl9pPr>
   </p:defaultTextStyle>
+  <p:extLst>
+    <p:ext uri="{EFAFB233-063F-42B5-8137-9DF3F51BA10A}">
+      <p15:sldGuideLst xmlns:p15="http://schemas.microsoft.com/office/powerpoint/2012/main"/>
+    </p:ext>
+  </p:extLst>
 </p:presentation>
 </file>
 
@@ -3973,6 +3979,530 @@
 </p:sld>
 </file>
 
+<file path=ppt/slides/slide2.xml><?xml version="1.0" encoding="utf-8"?>
+<p:sld xmlns:a="http://schemas.openxmlformats.org/drawingml/2006/main" xmlns:r="http://schemas.openxmlformats.org/officeDocument/2006/relationships" xmlns:p="http://schemas.openxmlformats.org/presentationml/2006/main">
+  <p:cSld>
+    <p:spTree>
+      <p:nvGrpSpPr>
+        <p:cNvPr id="1" name=""/>
+        <p:cNvGrpSpPr/>
+        <p:nvPr/>
+      </p:nvGrpSpPr>
+      <p:grpSpPr>
+        <a:xfrm>
+          <a:off x="0" y="0"/>
+          <a:ext cx="0" cy="0"/>
+          <a:chOff x="0" y="0"/>
+          <a:chExt cx="0" cy="0"/>
+        </a:xfrm>
+      </p:grpSpPr>
+      <p:sp>
+        <p:nvSpPr>
+          <p:cNvPr id="4" name="Rectangle 3">
+            <a:extLst>
+              <a:ext uri="{FF2B5EF4-FFF2-40B4-BE49-F238E27FC236}">
+                <a16:creationId xmlns:a16="http://schemas.microsoft.com/office/drawing/2014/main" id="{1AFA4A13-8458-CB47-B89F-E3C19544637D}"/>
+              </a:ext>
+            </a:extLst>
+          </p:cNvPr>
+          <p:cNvSpPr/>
+          <p:nvPr/>
+        </p:nvSpPr>
+        <p:spPr bwMode="auto">
+          <a:xfrm>
+            <a:off x="3224463" y="1617044"/>
+            <a:ext cx="2050181" cy="1020278"/>
+          </a:xfrm>
+          <a:prstGeom prst="rect">
+            <a:avLst/>
+          </a:prstGeom>
+          <a:solidFill>
+            <a:schemeClr val="bg1">
+              <a:lumMod val="85000"/>
+            </a:schemeClr>
+          </a:solidFill>
+          <a:ln w="12700">
+            <a:solidFill>
+              <a:schemeClr val="tx1"/>
+            </a:solidFill>
+            <a:headEnd type="none" w="med" len="med"/>
+            <a:tailEnd type="none" w="med" len="med"/>
+          </a:ln>
+        </p:spPr>
+        <p:style>
+          <a:lnRef idx="1">
+            <a:schemeClr val="accent5"/>
+          </a:lnRef>
+          <a:fillRef idx="2">
+            <a:schemeClr val="accent5"/>
+          </a:fillRef>
+          <a:effectRef idx="1">
+            <a:schemeClr val="accent5"/>
+          </a:effectRef>
+          <a:fontRef idx="minor">
+            <a:schemeClr val="dk1"/>
+          </a:fontRef>
+        </p:style>
+        <p:txBody>
+          <a:bodyPr vert="horz" wrap="square" lIns="0" tIns="0" rIns="0" bIns="0" numCol="1" rtlCol="0" anchor="ctr" anchorCtr="0" compatLnSpc="1">
+            <a:prstTxWarp prst="textNoShape">
+              <a:avLst/>
+            </a:prstTxWarp>
+            <a:noAutofit/>
+          </a:bodyPr>
+          <a:lstStyle/>
+          <a:p>
+            <a:pPr marL="230188" marR="0" indent="-230188" algn="ctr" defTabSz="914400" rtl="0" eaLnBrk="0" fontAlgn="base" latinLnBrk="0" hangingPunct="0">
+              <a:lnSpc>
+                <a:spcPct val="100000"/>
+              </a:lnSpc>
+              <a:spcBef>
+                <a:spcPct val="20000"/>
+              </a:spcBef>
+              <a:spcAft>
+                <a:spcPct val="0"/>
+              </a:spcAft>
+              <a:buClr>
+                <a:schemeClr val="tx1"/>
+              </a:buClr>
+              <a:buSzPct val="110000"/>
+              <a:buFontTx/>
+              <a:buNone/>
+              <a:tabLst/>
+            </a:pPr>
+            <a:r>
+              <a:rPr kumimoji="0" lang="en-US" sz="2400" b="0" i="0" u="none" strike="noStrike" cap="none" normalizeH="0" baseline="0" dirty="0">
+                <a:ln>
+                  <a:noFill/>
+                </a:ln>
+                <a:solidFill>
+                  <a:schemeClr val="tx1"/>
+                </a:solidFill>
+                <a:effectLst/>
+                <a:latin typeface="Arial" charset="0"/>
+              </a:rPr>
+              <a:t>Protocol</a:t>
+            </a:r>
+          </a:p>
+        </p:txBody>
+      </p:sp>
+      <p:sp>
+        <p:nvSpPr>
+          <p:cNvPr id="5" name="TextBox 4">
+            <a:extLst>
+              <a:ext uri="{FF2B5EF4-FFF2-40B4-BE49-F238E27FC236}">
+                <a16:creationId xmlns:a16="http://schemas.microsoft.com/office/drawing/2014/main" id="{4B43135A-5179-B945-AC55-6B0DB558A362}"/>
+              </a:ext>
+            </a:extLst>
+          </p:cNvPr>
+          <p:cNvSpPr txBox="1"/>
+          <p:nvPr/>
+        </p:nvSpPr>
+        <p:spPr>
+          <a:xfrm>
+            <a:off x="943280" y="1942517"/>
+            <a:ext cx="1082348" cy="369332"/>
+          </a:xfrm>
+          <a:prstGeom prst="rect">
+            <a:avLst/>
+          </a:prstGeom>
+          <a:noFill/>
+        </p:spPr>
+        <p:txBody>
+          <a:bodyPr wrap="none" rtlCol="0">
+            <a:spAutoFit/>
+          </a:bodyPr>
+          <a:lstStyle/>
+          <a:p>
+            <a:r>
+              <a:rPr lang="en-US" dirty="0"/>
+              <a:t>Samples</a:t>
+            </a:r>
+          </a:p>
+        </p:txBody>
+      </p:sp>
+      <p:sp>
+        <p:nvSpPr>
+          <p:cNvPr id="6" name="TextBox 5">
+            <a:extLst>
+              <a:ext uri="{FF2B5EF4-FFF2-40B4-BE49-F238E27FC236}">
+                <a16:creationId xmlns:a16="http://schemas.microsoft.com/office/drawing/2014/main" id="{DDC4AA2A-FC34-1F46-963C-FAC69AB13F67}"/>
+              </a:ext>
+            </a:extLst>
+          </p:cNvPr>
+          <p:cNvSpPr txBox="1"/>
+          <p:nvPr/>
+        </p:nvSpPr>
+        <p:spPr>
+          <a:xfrm>
+            <a:off x="3560903" y="742655"/>
+            <a:ext cx="1377300" cy="369332"/>
+          </a:xfrm>
+          <a:prstGeom prst="rect">
+            <a:avLst/>
+          </a:prstGeom>
+          <a:noFill/>
+        </p:spPr>
+        <p:txBody>
+          <a:bodyPr wrap="none" rtlCol="0">
+            <a:spAutoFit/>
+          </a:bodyPr>
+          <a:lstStyle/>
+          <a:p>
+            <a:r>
+              <a:rPr lang="en-US" dirty="0"/>
+              <a:t>Parameters</a:t>
+            </a:r>
+          </a:p>
+        </p:txBody>
+      </p:sp>
+      <p:sp>
+        <p:nvSpPr>
+          <p:cNvPr id="7" name="TextBox 6">
+            <a:extLst>
+              <a:ext uri="{FF2B5EF4-FFF2-40B4-BE49-F238E27FC236}">
+                <a16:creationId xmlns:a16="http://schemas.microsoft.com/office/drawing/2014/main" id="{E9D129C2-3289-A949-B952-65DD1BF91CC1}"/>
+              </a:ext>
+            </a:extLst>
+          </p:cNvPr>
+          <p:cNvSpPr txBox="1"/>
+          <p:nvPr/>
+        </p:nvSpPr>
+        <p:spPr>
+          <a:xfrm>
+            <a:off x="6348356" y="1942517"/>
+            <a:ext cx="1710725" cy="369332"/>
+          </a:xfrm>
+          <a:prstGeom prst="rect">
+            <a:avLst/>
+          </a:prstGeom>
+          <a:noFill/>
+        </p:spPr>
+        <p:txBody>
+          <a:bodyPr wrap="none" rtlCol="0">
+            <a:spAutoFit/>
+          </a:bodyPr>
+          <a:lstStyle/>
+          <a:p>
+            <a:r>
+              <a:rPr lang="en-US" dirty="0"/>
+              <a:t>Measurements</a:t>
+            </a:r>
+          </a:p>
+        </p:txBody>
+      </p:sp>
+      <p:cxnSp>
+        <p:nvCxnSpPr>
+          <p:cNvPr id="8" name="Straight Arrow Connector 7">
+            <a:extLst>
+              <a:ext uri="{FF2B5EF4-FFF2-40B4-BE49-F238E27FC236}">
+                <a16:creationId xmlns:a16="http://schemas.microsoft.com/office/drawing/2014/main" id="{713AB186-6D19-8844-9C49-D27CB7D81761}"/>
+              </a:ext>
+            </a:extLst>
+          </p:cNvPr>
+          <p:cNvCxnSpPr>
+            <a:stCxn id="5" idx="3"/>
+            <a:endCxn id="4" idx="1"/>
+          </p:cNvCxnSpPr>
+          <p:nvPr/>
+        </p:nvCxnSpPr>
+        <p:spPr bwMode="auto">
+          <a:xfrm>
+            <a:off x="2025628" y="2127183"/>
+            <a:ext cx="1198835" cy="0"/>
+          </a:xfrm>
+          <a:prstGeom prst="straightConnector1">
+            <a:avLst/>
+          </a:prstGeom>
+          <a:noFill/>
+          <a:ln w="57150" cap="flat" cmpd="sng" algn="ctr">
+            <a:solidFill>
+              <a:schemeClr val="tx1"/>
+            </a:solidFill>
+            <a:prstDash val="solid"/>
+            <a:round/>
+            <a:headEnd type="none" w="med" len="med"/>
+            <a:tailEnd type="triangle"/>
+          </a:ln>
+          <a:effectLst/>
+        </p:spPr>
+      </p:cxnSp>
+      <p:cxnSp>
+        <p:nvCxnSpPr>
+          <p:cNvPr id="9" name="Straight Arrow Connector 8">
+            <a:extLst>
+              <a:ext uri="{FF2B5EF4-FFF2-40B4-BE49-F238E27FC236}">
+                <a16:creationId xmlns:a16="http://schemas.microsoft.com/office/drawing/2014/main" id="{20F1DB73-80AD-3948-ABD3-67AE14DC2B4A}"/>
+              </a:ext>
+            </a:extLst>
+          </p:cNvPr>
+          <p:cNvCxnSpPr>
+            <a:cxnSpLocks/>
+            <a:endCxn id="7" idx="1"/>
+          </p:cNvCxnSpPr>
+          <p:nvPr/>
+        </p:nvCxnSpPr>
+        <p:spPr bwMode="auto">
+          <a:xfrm>
+            <a:off x="5274644" y="2127183"/>
+            <a:ext cx="1073712" cy="0"/>
+          </a:xfrm>
+          <a:prstGeom prst="straightConnector1">
+            <a:avLst/>
+          </a:prstGeom>
+          <a:noFill/>
+          <a:ln w="57150" cap="flat" cmpd="sng" algn="ctr">
+            <a:solidFill>
+              <a:schemeClr val="tx1"/>
+            </a:solidFill>
+            <a:prstDash val="solid"/>
+            <a:round/>
+            <a:headEnd type="none" w="med" len="med"/>
+            <a:tailEnd type="triangle"/>
+          </a:ln>
+          <a:effectLst/>
+        </p:spPr>
+      </p:cxnSp>
+      <p:cxnSp>
+        <p:nvCxnSpPr>
+          <p:cNvPr id="10" name="Straight Arrow Connector 9">
+            <a:extLst>
+              <a:ext uri="{FF2B5EF4-FFF2-40B4-BE49-F238E27FC236}">
+                <a16:creationId xmlns:a16="http://schemas.microsoft.com/office/drawing/2014/main" id="{CE970648-F1B8-6645-BEF2-89D87801EA6A}"/>
+              </a:ext>
+            </a:extLst>
+          </p:cNvPr>
+          <p:cNvCxnSpPr>
+            <a:cxnSpLocks/>
+            <a:stCxn id="6" idx="2"/>
+            <a:endCxn id="4" idx="0"/>
+          </p:cNvCxnSpPr>
+          <p:nvPr/>
+        </p:nvCxnSpPr>
+        <p:spPr bwMode="auto">
+          <a:xfrm>
+            <a:off x="4249553" y="1111987"/>
+            <a:ext cx="1" cy="505057"/>
+          </a:xfrm>
+          <a:prstGeom prst="straightConnector1">
+            <a:avLst/>
+          </a:prstGeom>
+          <a:noFill/>
+          <a:ln w="57150" cap="flat" cmpd="sng" algn="ctr">
+            <a:solidFill>
+              <a:schemeClr val="tx1"/>
+            </a:solidFill>
+            <a:prstDash val="solid"/>
+            <a:round/>
+            <a:headEnd type="none" w="med" len="med"/>
+            <a:tailEnd type="triangle"/>
+          </a:ln>
+          <a:effectLst/>
+        </p:spPr>
+      </p:cxnSp>
+      <p:sp>
+        <p:nvSpPr>
+          <p:cNvPr id="11" name="TextBox 10">
+            <a:extLst>
+              <a:ext uri="{FF2B5EF4-FFF2-40B4-BE49-F238E27FC236}">
+                <a16:creationId xmlns:a16="http://schemas.microsoft.com/office/drawing/2014/main" id="{8708BD1E-E929-A040-A757-4B5A2ADD41A8}"/>
+              </a:ext>
+            </a:extLst>
+          </p:cNvPr>
+          <p:cNvSpPr txBox="1"/>
+          <p:nvPr/>
+        </p:nvSpPr>
+        <p:spPr>
+          <a:xfrm>
+            <a:off x="6439301" y="2254098"/>
+            <a:ext cx="1915396" cy="738664"/>
+          </a:xfrm>
+          <a:prstGeom prst="rect">
+            <a:avLst/>
+          </a:prstGeom>
+          <a:noFill/>
+        </p:spPr>
+        <p:txBody>
+          <a:bodyPr wrap="none" rtlCol="0">
+            <a:spAutoFit/>
+          </a:bodyPr>
+          <a:lstStyle/>
+          <a:p>
+            <a:r>
+              <a:rPr lang="en-US" sz="1400" i="1" dirty="0">
+                <a:solidFill>
+                  <a:srgbClr val="0070C0"/>
+                </a:solidFill>
+              </a:rPr>
+              <a:t>instrument @ time</a:t>
+            </a:r>
+          </a:p>
+          <a:p>
+            <a:r>
+              <a:rPr lang="en-US" sz="1400" i="1" dirty="0">
+                <a:solidFill>
+                  <a:schemeClr val="tx1">
+                    <a:lumMod val="50000"/>
+                    <a:lumOff val="50000"/>
+                  </a:schemeClr>
+                </a:solidFill>
+              </a:rPr>
+              <a:t>    </a:t>
+            </a:r>
+            <a:r>
+              <a:rPr lang="en-US" sz="1400" i="1" dirty="0">
+                <a:solidFill>
+                  <a:srgbClr val="C00000"/>
+                </a:solidFill>
+              </a:rPr>
+              <a:t>available instruments</a:t>
+            </a:r>
+          </a:p>
+          <a:p>
+            <a:r>
+              <a:rPr lang="en-US" sz="1400" i="1" dirty="0">
+                <a:solidFill>
+                  <a:srgbClr val="C00000"/>
+                </a:solidFill>
+              </a:rPr>
+              <a:t>    legal times</a:t>
+            </a:r>
+          </a:p>
+        </p:txBody>
+      </p:sp>
+      <p:sp>
+        <p:nvSpPr>
+          <p:cNvPr id="12" name="TextBox 11">
+            <a:extLst>
+              <a:ext uri="{FF2B5EF4-FFF2-40B4-BE49-F238E27FC236}">
+                <a16:creationId xmlns:a16="http://schemas.microsoft.com/office/drawing/2014/main" id="{977ECF44-BA66-094C-8C32-93412DF8732C}"/>
+              </a:ext>
+            </a:extLst>
+          </p:cNvPr>
+          <p:cNvSpPr txBox="1"/>
+          <p:nvPr/>
+        </p:nvSpPr>
+        <p:spPr>
+          <a:xfrm>
+            <a:off x="4255783" y="1039530"/>
+            <a:ext cx="2011705" cy="523220"/>
+          </a:xfrm>
+          <a:prstGeom prst="rect">
+            <a:avLst/>
+          </a:prstGeom>
+          <a:noFill/>
+        </p:spPr>
+        <p:txBody>
+          <a:bodyPr wrap="none" rtlCol="0">
+            <a:spAutoFit/>
+          </a:bodyPr>
+          <a:lstStyle/>
+          <a:p>
+            <a:r>
+              <a:rPr lang="en-US" sz="1400" i="1" dirty="0">
+                <a:solidFill>
+                  <a:srgbClr val="0070C0"/>
+                </a:solidFill>
+              </a:rPr>
+              <a:t>name/value pairs</a:t>
+            </a:r>
+          </a:p>
+          <a:p>
+            <a:r>
+              <a:rPr lang="en-US" sz="1400" i="1" dirty="0">
+                <a:solidFill>
+                  <a:schemeClr val="tx1">
+                    <a:lumMod val="50000"/>
+                    <a:lumOff val="50000"/>
+                  </a:schemeClr>
+                </a:solidFill>
+              </a:rPr>
+              <a:t>    </a:t>
+            </a:r>
+            <a:r>
+              <a:rPr lang="en-US" sz="1400" i="1" dirty="0">
+                <a:solidFill>
+                  <a:srgbClr val="C00000"/>
+                </a:solidFill>
+              </a:rPr>
+              <a:t>cardinality, legal range</a:t>
+            </a:r>
+          </a:p>
+        </p:txBody>
+      </p:sp>
+      <p:sp>
+        <p:nvSpPr>
+          <p:cNvPr id="13" name="TextBox 12">
+            <a:extLst>
+              <a:ext uri="{FF2B5EF4-FFF2-40B4-BE49-F238E27FC236}">
+                <a16:creationId xmlns:a16="http://schemas.microsoft.com/office/drawing/2014/main" id="{29A049E7-DB65-214E-AF61-0FFDDDD53444}"/>
+              </a:ext>
+            </a:extLst>
+          </p:cNvPr>
+          <p:cNvSpPr txBox="1"/>
+          <p:nvPr/>
+        </p:nvSpPr>
+        <p:spPr>
+          <a:xfrm>
+            <a:off x="1007041" y="2228364"/>
+            <a:ext cx="1998496" cy="523220"/>
+          </a:xfrm>
+          <a:prstGeom prst="rect">
+            <a:avLst/>
+          </a:prstGeom>
+          <a:noFill/>
+        </p:spPr>
+        <p:txBody>
+          <a:bodyPr wrap="none" rtlCol="0">
+            <a:spAutoFit/>
+          </a:bodyPr>
+          <a:lstStyle/>
+          <a:p>
+            <a:r>
+              <a:rPr lang="en-US" sz="1400" i="1" dirty="0">
+                <a:solidFill>
+                  <a:srgbClr val="0070C0"/>
+                </a:solidFill>
+              </a:rPr>
+              <a:t>combinatorial SBOL</a:t>
+            </a:r>
+          </a:p>
+          <a:p>
+            <a:r>
+              <a:rPr lang="en-US" sz="1400" i="1" dirty="0">
+                <a:solidFill>
+                  <a:schemeClr val="tx1">
+                    <a:lumMod val="50000"/>
+                    <a:lumOff val="50000"/>
+                  </a:schemeClr>
+                </a:solidFill>
+              </a:rPr>
+              <a:t>    </a:t>
+            </a:r>
+            <a:r>
+              <a:rPr lang="en-US" sz="1400" i="1" dirty="0">
+                <a:solidFill>
+                  <a:srgbClr val="C00000"/>
+                </a:solidFill>
+              </a:rPr>
+              <a:t>cardinality, constraints</a:t>
+            </a:r>
+          </a:p>
+        </p:txBody>
+      </p:sp>
+    </p:spTree>
+    <p:extLst>
+      <p:ext uri="{BB962C8B-B14F-4D97-AF65-F5344CB8AC3E}">
+        <p14:creationId xmlns:p14="http://schemas.microsoft.com/office/powerpoint/2010/main" val="3455746717"/>
+      </p:ext>
+    </p:extLst>
+  </p:cSld>
+  <p:clrMapOvr>
+    <a:masterClrMapping/>
+  </p:clrMapOvr>
+</p:sld>
+</file>
+
 <file path=ppt/theme/theme1.xml><?xml version="1.0" encoding="utf-8"?>
 <a:theme xmlns:a="http://schemas.openxmlformats.org/drawingml/2006/main" name="Office Theme">
   <a:themeElements>

</xml_diff>